<commit_message>
Changed Use Case diagram to match specification. Modified slides to reflect the proper capitalization and spacing of use case functions. Moved old presentation drafts. presentation-final.pptx and presentation-master.pptx are both up-to-date and ready for redundancy.
</commit_message>
<xml_diff>
--- a/presentations/presentation-final.pptx
+++ b/presentations/presentation-final.pptx
@@ -21,7 +21,7 @@
   <p:notesSz cx="6858000" cy="9144000"/>
   <p:embeddedFontLst>
     <p:embeddedFont>
-      <p:font typeface="Crimson Text" panose="020B0604020202020204" charset="0"/>
+      <p:font typeface="Crimson Text" panose="02000503000000000000" pitchFamily="2" charset="0"/>
       <p:regular r:id="rId10"/>
       <p:bold r:id="rId11"/>
       <p:italic r:id="rId12"/>
@@ -15156,13 +15156,6 @@
       </p:transition>
     </mc:Fallback>
   </mc:AlternateContent>
-  <p:timing>
-    <p:tnLst>
-      <p:par>
-        <p:cTn id="1" dur="indefinite" restart="never" nodeType="tmRoot"/>
-      </p:par>
-    </p:tnLst>
-  </p:timing>
 </p:sld>
 </file>
 
@@ -15195,65 +15188,201 @@
         </p:nvSpPr>
         <p:spPr>
           <a:xfrm>
-            <a:off x="7588155" y="571500"/>
-            <a:ext cx="4394579" cy="2197100"/>
+            <a:off x="7693891" y="3048000"/>
+            <a:ext cx="4304144" cy="3463636"/>
           </a:xfrm>
         </p:spPr>
         <p:txBody>
-          <a:bodyPr/>
+          <a:bodyPr anchor="t" anchorCtr="0">
+            <a:normAutofit/>
+          </a:bodyPr>
           <a:lstStyle/>
           <a:p>
             <a:r>
-              <a:rPr lang="en-US" dirty="0" smtClean="0"/>
-              <a:t>Employee Scheduling System:</a:t>
+              <a:rPr lang="en-US" sz="2200" b="0" dirty="0"/>
+              <a:t>- Actors</a:t>
             </a:r>
             <a:r>
-              <a:rPr lang="en-US" dirty="0"/>
-              <a:t/>
+              <a:rPr lang="en-US" sz="2200" dirty="0"/>
+              <a:t>: Employee </a:t>
+            </a:r>
+            <a:r>
+              <a:rPr lang="en-US" sz="2200" b="0" dirty="0"/>
+              <a:t>&amp; </a:t>
+            </a:r>
+            <a:r>
+              <a:rPr lang="en-US" sz="2200" dirty="0"/>
+              <a:t>Supervisor</a:t>
             </a:r>
             <a:br>
-              <a:rPr lang="en-US" dirty="0"/>
+              <a:rPr lang="en-US" sz="2200" dirty="0"/>
+            </a:br>
+            <a:br>
+              <a:rPr lang="en-US" sz="2200" dirty="0"/>
             </a:br>
             <a:r>
-              <a:rPr lang="en-US" dirty="0" smtClean="0"/>
-              <a:t>Use </a:t>
+              <a:rPr lang="en-US" sz="2200" b="0" dirty="0"/>
+              <a:t>- Entry Condition: successful </a:t>
             </a:r>
             <a:r>
-              <a:rPr lang="en-US" dirty="0"/>
-              <a:t>Case </a:t>
+              <a:rPr lang="en-US" sz="2200" dirty="0"/>
+              <a:t>Login</a:t>
+            </a:r>
+            <a:br>
+              <a:rPr lang="en-US" sz="2200" dirty="0"/>
+            </a:br>
+            <a:br>
+              <a:rPr lang="en-US" sz="2200" b="0" dirty="0"/>
+            </a:br>
+            <a:r>
+              <a:rPr lang="en-US" sz="2200" b="0" dirty="0"/>
+              <a:t>- Exit Condition: </a:t>
             </a:r>
             <a:r>
-              <a:rPr lang="en-US" dirty="0" smtClean="0"/>
-              <a:t>Diagram</a:t>
+              <a:rPr lang="en-US" sz="2200" dirty="0"/>
+              <a:t>Logout, </a:t>
             </a:r>
-            <a:endParaRPr lang="en-US" dirty="0"/>
+            <a:r>
+              <a:rPr lang="en-US" sz="2200" b="0" dirty="0"/>
+              <a:t>invalid </a:t>
+            </a:r>
+            <a:r>
+              <a:rPr lang="en-US" sz="2200" dirty="0"/>
+              <a:t>Login,</a:t>
+            </a:r>
+            <a:r>
+              <a:rPr lang="en-US" sz="2200" b="0" dirty="0"/>
+              <a:t> or appropriate </a:t>
+            </a:r>
+            <a:r>
+              <a:rPr lang="en-US" sz="2200" dirty="0" err="1"/>
+              <a:t>RequestTimeOff</a:t>
+            </a:r>
+            <a:r>
+              <a:rPr lang="en-US" sz="2200" dirty="0"/>
+              <a:t> </a:t>
+            </a:r>
+            <a:r>
+              <a:rPr lang="en-US" sz="2200" b="0" dirty="0"/>
+              <a:t>or      </a:t>
+            </a:r>
+            <a:r>
+              <a:rPr lang="en-US" sz="2200" dirty="0" err="1"/>
+              <a:t>RequestResponse</a:t>
+            </a:r>
+            <a:r>
+              <a:rPr lang="en-US" sz="2200" b="0" dirty="0"/>
+              <a:t>.</a:t>
+            </a:r>
+            <a:endParaRPr lang="en-US" sz="2200" dirty="0"/>
           </a:p>
         </p:txBody>
       </p:sp>
-      <p:pic>
-        <p:nvPicPr>
-          <p:cNvPr id="6" name="Picture 5"/>
-          <p:cNvPicPr>
-            <a:picLocks noChangeAspect="1"/>
-          </p:cNvPicPr>
+      <p:sp>
+        <p:nvSpPr>
+          <p:cNvPr id="4" name="Title 1"/>
+          <p:cNvSpPr txBox="1">
+            <a:spLocks/>
+          </p:cNvSpPr>
           <p:nvPr/>
-        </p:nvPicPr>
-        <p:blipFill>
-          <a:blip r:embed="rId2"/>
-          <a:stretch>
-            <a:fillRect/>
-          </a:stretch>
-        </p:blipFill>
+        </p:nvSpPr>
         <p:spPr>
           <a:xfrm>
-            <a:off x="0" y="490755"/>
-            <a:ext cx="6910302" cy="5855458"/>
+            <a:off x="7797421" y="2334127"/>
+            <a:ext cx="4394579" cy="570342"/>
           </a:xfrm>
           <a:prstGeom prst="rect">
             <a:avLst/>
           </a:prstGeom>
         </p:spPr>
-      </p:pic>
+        <p:txBody>
+          <a:bodyPr vert="horz" lIns="91440" tIns="45720" rIns="91440" bIns="45720" rtlCol="0" anchor="b">
+            <a:normAutofit/>
+          </a:bodyPr>
+          <a:lstStyle>
+            <a:lvl1pPr algn="l" defTabSz="914400" rtl="0" eaLnBrk="1" latinLnBrk="0" hangingPunct="1">
+              <a:lnSpc>
+                <a:spcPct val="90000"/>
+              </a:lnSpc>
+              <a:spcBef>
+                <a:spcPct val="0"/>
+              </a:spcBef>
+              <a:buNone/>
+              <a:defRPr sz="2600" b="1" kern="1200">
+                <a:solidFill>
+                  <a:schemeClr val="bg1"/>
+                </a:solidFill>
+                <a:latin typeface="+mj-lt"/>
+                <a:ea typeface="+mj-ea"/>
+                <a:cs typeface="+mj-cs"/>
+              </a:defRPr>
+            </a:lvl1pPr>
+          </a:lstStyle>
+          <a:p>
+            <a:r>
+              <a:rPr lang="en-US" dirty="0"/>
+              <a:t>Use Case Diagram</a:t>
+            </a:r>
+          </a:p>
+        </p:txBody>
+      </p:sp>
+      <p:graphicFrame>
+        <p:nvGraphicFramePr>
+          <p:cNvPr id="3" name="Object 2"/>
+          <p:cNvGraphicFramePr>
+            <a:graphicFrameLocks noChangeAspect="1"/>
+          </p:cNvGraphicFramePr>
+          <p:nvPr>
+            <p:extLst>
+              <p:ext uri="{D42A27DB-BD31-4B8C-83A1-F6EECF244321}">
+                <p14:modId xmlns:p14="http://schemas.microsoft.com/office/powerpoint/2010/main" val="1880261706"/>
+              </p:ext>
+            </p:extLst>
+          </p:nvPr>
+        </p:nvGraphicFramePr>
+        <p:xfrm>
+          <a:off x="66676" y="97511"/>
+          <a:ext cx="7096124" cy="6654760"/>
+        </p:xfrm>
+        <a:graphic>
+          <a:graphicData uri="http://schemas.openxmlformats.org/presentationml/2006/ole">
+            <mc:AlternateContent xmlns:mc="http://schemas.openxmlformats.org/markup-compatibility/2006">
+              <mc:Choice xmlns:v="urn:schemas-microsoft-com:vml" Requires="v">
+                <p:oleObj spid="_x0000_s1031" name="Visio" r:id="rId3" imgW="7223601" imgH="6774149" progId="Visio.Drawing.15">
+                  <p:embed/>
+                </p:oleObj>
+              </mc:Choice>
+              <mc:Fallback>
+                <p:oleObj name="Visio" r:id="rId3" imgW="7223601" imgH="6774149" progId="Visio.Drawing.15">
+                  <p:embed/>
+                  <p:pic>
+                    <p:nvPicPr>
+                      <p:cNvPr id="0" name=""/>
+                      <p:cNvPicPr/>
+                      <p:nvPr/>
+                    </p:nvPicPr>
+                    <p:blipFill>
+                      <a:blip r:embed="rId4"/>
+                      <a:stretch>
+                        <a:fillRect/>
+                      </a:stretch>
+                    </p:blipFill>
+                    <p:spPr>
+                      <a:xfrm>
+                        <a:off x="66676" y="97511"/>
+                        <a:ext cx="7096124" cy="6654760"/>
+                      </a:xfrm>
+                      <a:prstGeom prst="rect">
+                        <a:avLst/>
+                      </a:prstGeom>
+                    </p:spPr>
+                  </p:pic>
+                </p:oleObj>
+              </mc:Fallback>
+            </mc:AlternateContent>
+          </a:graphicData>
+        </a:graphic>
+      </p:graphicFrame>
     </p:spTree>
     <p:extLst>
       <p:ext uri="{BB962C8B-B14F-4D97-AF65-F5344CB8AC3E}">
@@ -15276,13 +15405,6 @@
       </p:transition>
     </mc:Fallback>
   </mc:AlternateContent>
-  <p:timing>
-    <p:tnLst>
-      <p:par>
-        <p:cTn id="1" dur="indefinite" restart="never" nodeType="tmRoot"/>
-      </p:par>
-    </p:tnLst>
-  </p:timing>
 </p:sld>
 </file>
 
@@ -15329,14 +15451,13 @@
               <a:buNone/>
             </a:pPr>
             <a:r>
-              <a:rPr lang="en-US" sz="3200" dirty="0"/>
-              <a:t>Employee Request GUI </a:t>
+              <a:rPr lang="en-US" sz="3200" dirty="0" err="1"/>
+              <a:t>RequestTimeOff</a:t>
             </a:r>
             <a:r>
-              <a:rPr lang="en-US" sz="3200" dirty="0" smtClean="0"/>
-              <a:t>Mockup</a:t>
+              <a:rPr lang="en-US" sz="3200" dirty="0"/>
+              <a:t> GUI Mockup</a:t>
             </a:r>
-            <a:endParaRPr lang="en-US" sz="3200" dirty="0"/>
           </a:p>
         </p:txBody>
       </p:sp>
@@ -15386,13 +15507,6 @@
       </p:transition>
     </mc:Fallback>
   </mc:AlternateContent>
-  <p:timing>
-    <p:tnLst>
-      <p:par>
-        <p:cTn id="1" dur="indefinite" restart="never" nodeType="tmRoot"/>
-      </p:par>
-    </p:tnLst>
-  </p:timing>
 </p:sld>
 </file>
 
@@ -15439,10 +15553,13 @@
               <a:buNone/>
             </a:pPr>
             <a:r>
-              <a:rPr lang="en-US" sz="3200" dirty="0" smtClean="0"/>
-              <a:t>Supervisor Response GUI Mockup</a:t>
+              <a:rPr lang="en-US" sz="3200" dirty="0" err="1"/>
+              <a:t>RequestResponse</a:t>
             </a:r>
-            <a:endParaRPr lang="en-US" sz="3200" dirty="0"/>
+            <a:r>
+              <a:rPr lang="en-US" sz="3200" dirty="0"/>
+              <a:t> GUI Mockup</a:t>
+            </a:r>
           </a:p>
         </p:txBody>
       </p:sp>
@@ -15492,13 +15609,6 @@
       </p:transition>
     </mc:Fallback>
   </mc:AlternateContent>
-  <p:timing>
-    <p:tnLst>
-      <p:par>
-        <p:cTn id="1" dur="indefinite" restart="never" nodeType="tmRoot"/>
-      </p:par>
-    </p:tnLst>
-  </p:timing>
 </p:sld>
 </file>
 
@@ -15542,10 +15652,9 @@
           <a:lstStyle/>
           <a:p>
             <a:r>
-              <a:rPr lang="en-US" dirty="0" smtClean="0"/>
+              <a:rPr lang="en-US" dirty="0"/>
               <a:t>Conclusion</a:t>
             </a:r>
-            <a:endParaRPr lang="en-US" dirty="0"/>
           </a:p>
         </p:txBody>
       </p:sp>
@@ -15566,49 +15675,38 @@
           </a:xfrm>
         </p:spPr>
         <p:txBody>
-          <a:bodyPr/>
+          <a:bodyPr>
+            <a:normAutofit lnSpcReduction="10000"/>
+          </a:bodyPr>
           <a:lstStyle/>
           <a:p>
             <a:r>
-              <a:rPr lang="en-US" dirty="0" smtClean="0"/>
-              <a:t>Our employee scheduling application will facilitate secure login in and log out of the system.</a:t>
+              <a:rPr lang="en-US" dirty="0"/>
+              <a:t>Scheduling system will facilitate secure login, logout, and authorization.</a:t>
             </a:r>
           </a:p>
           <a:p>
             <a:r>
               <a:rPr lang="en-US" dirty="0"/>
-              <a:t>With our </a:t>
-            </a:r>
-            <a:r>
-              <a:rPr lang="en-US" dirty="0" smtClean="0"/>
-              <a:t>application</a:t>
-            </a:r>
-            <a:r>
-              <a:rPr lang="en-US" dirty="0"/>
-              <a:t>, employees will be able to quickly request time off of work and their supervisors are easily able to approve or deny that request</a:t>
-            </a:r>
-            <a:r>
-              <a:rPr lang="en-US" dirty="0" smtClean="0"/>
-              <a:t>.</a:t>
+              <a:t>Application interfaces with employees who are then able to quickly request time off, and their supervisors can easily approve or deny that request.</a:t>
             </a:r>
           </a:p>
           <a:p>
             <a:r>
-              <a:rPr lang="en-US" dirty="0" smtClean="0"/>
-              <a:t>Our system offers the benefit of weighted </a:t>
+              <a:rPr lang="en-US" dirty="0"/>
+              <a:t>The system offers the benefit of weighted leave requests to ensure minimal scheduling conflicts between multiple employees. </a:t>
+            </a:r>
+          </a:p>
+          <a:p>
+            <a:r>
+              <a:rPr lang="en-US" dirty="0"/>
+              <a:t>Login / Logout functionality directs user to </a:t>
             </a:r>
             <a:r>
-              <a:rPr lang="en-US" smtClean="0"/>
-              <a:t>leave </a:t>
+              <a:rPr lang="en-US"/>
+              <a:t>appropriate interface.</a:t>
             </a:r>
-            <a:r>
-              <a:rPr lang="en-US" smtClean="0"/>
-              <a:t>requests </a:t>
-            </a:r>
-            <a:r>
-              <a:rPr lang="en-US" dirty="0" smtClean="0"/>
-              <a:t>to ensure minimal time off conflicts between multiple employees. </a:t>
-            </a:r>
+            <a:endParaRPr lang="en-US" dirty="0"/>
           </a:p>
           <a:p>
             <a:r>
@@ -15656,13 +15754,6 @@
       </p:transition>
     </mc:Fallback>
   </mc:AlternateContent>
-  <p:timing>
-    <p:tnLst>
-      <p:par>
-        <p:cTn id="1" dur="indefinite" restart="never" nodeType="tmRoot"/>
-      </p:par>
-    </p:tnLst>
-  </p:timing>
 </p:sld>
 </file>
 

</xml_diff>

<commit_message>
Fixed present-tense grammatical error and logical flow.
</commit_message>
<xml_diff>
--- a/presentations/presentation-final.pptx
+++ b/presentations/presentation-final.pptx
@@ -15348,7 +15348,7 @@
           <a:graphicData uri="http://schemas.openxmlformats.org/presentationml/2006/ole">
             <mc:AlternateContent xmlns:mc="http://schemas.openxmlformats.org/markup-compatibility/2006">
               <mc:Choice xmlns:v="urn:schemas-microsoft-com:vml" Requires="v">
-                <p:oleObj spid="_x0000_s1031" name="Visio" r:id="rId3" imgW="7223601" imgH="6774149" progId="Visio.Drawing.15">
+                <p:oleObj spid="_x0000_s1036" name="Visio" r:id="rId3" imgW="7223601" imgH="6774149" progId="Visio.Drawing.15">
                   <p:embed/>
                 </p:oleObj>
               </mc:Choice>
@@ -15653,7 +15653,7 @@
           <a:p>
             <a:r>
               <a:rPr lang="en-US" dirty="0"/>
-              <a:t>Conclusion</a:t>
+              <a:t>Summary</a:t>
             </a:r>
           </a:p>
         </p:txBody>
@@ -15671,12 +15671,12 @@
         <p:spPr>
           <a:xfrm>
             <a:off x="1295400" y="1550897"/>
-            <a:ext cx="9601200" cy="2761128"/>
+            <a:ext cx="9863138" cy="4378416"/>
           </a:xfrm>
         </p:spPr>
         <p:txBody>
           <a:bodyPr>
-            <a:normAutofit lnSpcReduction="10000"/>
+            <a:normAutofit/>
           </a:bodyPr>
           <a:lstStyle/>
           <a:p>
@@ -15688,25 +15688,26 @@
           <a:p>
             <a:r>
               <a:rPr lang="en-US" dirty="0"/>
-              <a:t>Application interfaces with employees who are then able to quickly request time off, and their supervisors can easily approve or deny that request.</a:t>
+              <a:t>Login / Logout functionality will direct user to appropriate interface.</a:t>
             </a:r>
           </a:p>
           <a:p>
             <a:r>
               <a:rPr lang="en-US" dirty="0"/>
-              <a:t>The system offers the benefit of weighted leave requests to ensure minimal scheduling conflicts between multiple employees. </a:t>
+              <a:t>Application will interface with employees who are then able to quickly request time off, and their supervisors can easily approve or deny that request.</a:t>
             </a:r>
           </a:p>
           <a:p>
             <a:r>
               <a:rPr lang="en-US" dirty="0"/>
-              <a:t>Login / Logout functionality directs user to </a:t>
+              <a:t>The system will offer the benefit of weighted leave requests to ensure minimal scheduling conflicts between multiple employees. </a:t>
             </a:r>
+          </a:p>
+          <a:p>
             <a:r>
-              <a:rPr lang="en-US"/>
-              <a:t>appropriate interface.</a:t>
+              <a:rPr lang="en-US" dirty="0"/>
+              <a:t>Full documentation available in public repository.</a:t>
             </a:r>
-            <a:endParaRPr lang="en-US" dirty="0"/>
           </a:p>
           <a:p>
             <a:r>

</xml_diff>